<commit_message>
Alteração no desenho de solução
</commit_message>
<xml_diff>
--- a/Documentacao/desenho-de-solucao.pptx
+++ b/Documentacao/desenho-de-solucao.pptx
@@ -5,7 +5,7 @@
     <p:sldMasterId id="2147483648" r:id="rId1"/>
   </p:sldMasterIdLst>
   <p:sldIdLst>
-    <p:sldId id="256" r:id="rId2"/>
+    <p:sldId id="275" r:id="rId2"/>
   </p:sldIdLst>
   <p:sldSz cx="12192000" cy="6858000"/>
   <p:notesSz cx="6858000" cy="9144000"/>
@@ -477,7 +477,7 @@
           <a:p>
             <a:fld id="{EB60841A-4D04-44D0-9551-1643E2F32A38}" type="datetimeFigureOut">
               <a:rPr lang="pt-BR" smtClean="0"/>
-              <a:t>09/09/2020</a:t>
+              <a:t>21/09/2020</a:t>
             </a:fld>
             <a:endParaRPr lang="pt-BR"/>
           </a:p>
@@ -675,7 +675,7 @@
           <a:p>
             <a:fld id="{EB60841A-4D04-44D0-9551-1643E2F32A38}" type="datetimeFigureOut">
               <a:rPr lang="pt-BR" smtClean="0"/>
-              <a:t>09/09/2020</a:t>
+              <a:t>21/09/2020</a:t>
             </a:fld>
             <a:endParaRPr lang="pt-BR"/>
           </a:p>
@@ -883,7 +883,7 @@
           <a:p>
             <a:fld id="{EB60841A-4D04-44D0-9551-1643E2F32A38}" type="datetimeFigureOut">
               <a:rPr lang="pt-BR" smtClean="0"/>
-              <a:t>09/09/2020</a:t>
+              <a:t>21/09/2020</a:t>
             </a:fld>
             <a:endParaRPr lang="pt-BR"/>
           </a:p>
@@ -1081,7 +1081,7 @@
           <a:p>
             <a:fld id="{EB60841A-4D04-44D0-9551-1643E2F32A38}" type="datetimeFigureOut">
               <a:rPr lang="pt-BR" smtClean="0"/>
-              <a:t>09/09/2020</a:t>
+              <a:t>21/09/2020</a:t>
             </a:fld>
             <a:endParaRPr lang="pt-BR"/>
           </a:p>
@@ -1356,7 +1356,7 @@
           <a:p>
             <a:fld id="{EB60841A-4D04-44D0-9551-1643E2F32A38}" type="datetimeFigureOut">
               <a:rPr lang="pt-BR" smtClean="0"/>
-              <a:t>09/09/2020</a:t>
+              <a:t>21/09/2020</a:t>
             </a:fld>
             <a:endParaRPr lang="pt-BR"/>
           </a:p>
@@ -1621,7 +1621,7 @@
           <a:p>
             <a:fld id="{EB60841A-4D04-44D0-9551-1643E2F32A38}" type="datetimeFigureOut">
               <a:rPr lang="pt-BR" smtClean="0"/>
-              <a:t>09/09/2020</a:t>
+              <a:t>21/09/2020</a:t>
             </a:fld>
             <a:endParaRPr lang="pt-BR"/>
           </a:p>
@@ -2033,7 +2033,7 @@
           <a:p>
             <a:fld id="{EB60841A-4D04-44D0-9551-1643E2F32A38}" type="datetimeFigureOut">
               <a:rPr lang="pt-BR" smtClean="0"/>
-              <a:t>09/09/2020</a:t>
+              <a:t>21/09/2020</a:t>
             </a:fld>
             <a:endParaRPr lang="pt-BR"/>
           </a:p>
@@ -2174,7 +2174,7 @@
           <a:p>
             <a:fld id="{EB60841A-4D04-44D0-9551-1643E2F32A38}" type="datetimeFigureOut">
               <a:rPr lang="pt-BR" smtClean="0"/>
-              <a:t>09/09/2020</a:t>
+              <a:t>21/09/2020</a:t>
             </a:fld>
             <a:endParaRPr lang="pt-BR"/>
           </a:p>
@@ -2287,7 +2287,7 @@
           <a:p>
             <a:fld id="{EB60841A-4D04-44D0-9551-1643E2F32A38}" type="datetimeFigureOut">
               <a:rPr lang="pt-BR" smtClean="0"/>
-              <a:t>09/09/2020</a:t>
+              <a:t>21/09/2020</a:t>
             </a:fld>
             <a:endParaRPr lang="pt-BR"/>
           </a:p>
@@ -2598,7 +2598,7 @@
           <a:p>
             <a:fld id="{EB60841A-4D04-44D0-9551-1643E2F32A38}" type="datetimeFigureOut">
               <a:rPr lang="pt-BR" smtClean="0"/>
-              <a:t>09/09/2020</a:t>
+              <a:t>21/09/2020</a:t>
             </a:fld>
             <a:endParaRPr lang="pt-BR"/>
           </a:p>
@@ -2886,7 +2886,7 @@
           <a:p>
             <a:fld id="{EB60841A-4D04-44D0-9551-1643E2F32A38}" type="datetimeFigureOut">
               <a:rPr lang="pt-BR" smtClean="0"/>
-              <a:t>09/09/2020</a:t>
+              <a:t>21/09/2020</a:t>
             </a:fld>
             <a:endParaRPr lang="pt-BR"/>
           </a:p>
@@ -3127,7 +3127,7 @@
           <a:p>
             <a:fld id="{EB60841A-4D04-44D0-9551-1643E2F32A38}" type="datetimeFigureOut">
               <a:rPr lang="pt-BR" smtClean="0"/>
-              <a:t>09/09/2020</a:t>
+              <a:t>21/09/2020</a:t>
             </a:fld>
             <a:endParaRPr lang="pt-BR"/>
           </a:p>
@@ -3544,12 +3544,79 @@
           <a:chExt cx="0" cy="0"/>
         </a:xfrm>
       </p:grpSpPr>
+      <p:sp>
+        <p:nvSpPr>
+          <p:cNvPr id="2" name="Título 1">
+            <a:extLst>
+              <a:ext uri="{FF2B5EF4-FFF2-40B4-BE49-F238E27FC236}">
+                <a16:creationId xmlns:a16="http://schemas.microsoft.com/office/drawing/2014/main" id="{06FAC995-9B02-4C06-A511-B4B939CC48E4}"/>
+              </a:ext>
+            </a:extLst>
+          </p:cNvPr>
+          <p:cNvSpPr>
+            <a:spLocks noGrp="1"/>
+          </p:cNvSpPr>
+          <p:nvPr>
+            <p:ph type="title"/>
+          </p:nvPr>
+        </p:nvSpPr>
+        <p:spPr>
+          <a:xfrm>
+            <a:off x="4127213" y="-16177"/>
+            <a:ext cx="3489168" cy="434209"/>
+          </a:xfrm>
+        </p:spPr>
+        <p:txBody>
+          <a:bodyPr/>
+          <a:lstStyle/>
+          <a:p>
+            <a:r>
+              <a:rPr lang="pt-BR" sz="2400" b="1" dirty="0"/>
+              <a:t>Desenho de Solução</a:t>
+            </a:r>
+          </a:p>
+        </p:txBody>
+      </p:sp>
+      <p:sp>
+        <p:nvSpPr>
+          <p:cNvPr id="3" name="Espaço Reservado para Conteúdo 2">
+            <a:extLst>
+              <a:ext uri="{FF2B5EF4-FFF2-40B4-BE49-F238E27FC236}">
+                <a16:creationId xmlns:a16="http://schemas.microsoft.com/office/drawing/2014/main" id="{0F3D7A5F-2B7F-423F-B10A-DEF5640F9690}"/>
+              </a:ext>
+            </a:extLst>
+          </p:cNvPr>
+          <p:cNvSpPr>
+            <a:spLocks noGrp="1"/>
+          </p:cNvSpPr>
+          <p:nvPr>
+            <p:ph idx="1"/>
+          </p:nvPr>
+        </p:nvSpPr>
+        <p:spPr/>
+        <p:txBody>
+          <a:bodyPr/>
+          <a:lstStyle/>
+          <a:p>
+            <a:pPr marL="0" indent="0">
+              <a:buNone/>
+            </a:pPr>
+            <a:endParaRPr lang="pt-BR" dirty="0"/>
+          </a:p>
+          <a:p>
+            <a:pPr marL="0" indent="0">
+              <a:buNone/>
+            </a:pPr>
+            <a:endParaRPr lang="pt-BR" dirty="0"/>
+          </a:p>
+        </p:txBody>
+      </p:sp>
       <p:pic>
         <p:nvPicPr>
-          <p:cNvPr id="3" name="Imagem 2" descr="Uma imagem contendo placar, cerca&#10;&#10;Descrição gerada automaticamente">
-            <a:extLst>
-              <a:ext uri="{FF2B5EF4-FFF2-40B4-BE49-F238E27FC236}">
-                <a16:creationId xmlns:a16="http://schemas.microsoft.com/office/drawing/2014/main" id="{883D6E67-52BF-47BA-876F-CA1A6038221D}"/>
+          <p:cNvPr id="5" name="Imagem 4" descr="Uma imagem contendo placar, cerca&#10;&#10;Descrição gerada automaticamente">
+            <a:extLst>
+              <a:ext uri="{FF2B5EF4-FFF2-40B4-BE49-F238E27FC236}">
+                <a16:creationId xmlns:a16="http://schemas.microsoft.com/office/drawing/2014/main" id="{FDC788BF-0EFF-4E47-AA3D-B8265D3170D6}"/>
               </a:ext>
             </a:extLst>
           </p:cNvPr>
@@ -3572,7 +3639,7 @@
         </p:blipFill>
         <p:spPr>
           <a:xfrm>
-            <a:off x="-222292" y="387322"/>
+            <a:off x="253363" y="391925"/>
             <a:ext cx="2778711" cy="1607169"/>
           </a:xfrm>
           <a:prstGeom prst="rect">
@@ -3582,10 +3649,10 @@
       </p:pic>
       <p:pic>
         <p:nvPicPr>
-          <p:cNvPr id="3074" name="Picture 2">
-            <a:extLst>
-              <a:ext uri="{FF2B5EF4-FFF2-40B4-BE49-F238E27FC236}">
-                <a16:creationId xmlns:a16="http://schemas.microsoft.com/office/drawing/2014/main" id="{BEEFDACB-0716-480B-9BF2-0DB5DEB33E4F}"/>
+          <p:cNvPr id="9" name="Picture 2">
+            <a:extLst>
+              <a:ext uri="{FF2B5EF4-FFF2-40B4-BE49-F238E27FC236}">
+                <a16:creationId xmlns:a16="http://schemas.microsoft.com/office/drawing/2014/main" id="{AD56552D-D5A7-4B37-9261-F81F0E3EC899}"/>
               </a:ext>
             </a:extLst>
           </p:cNvPr>
@@ -3609,100 +3676,7 @@
         </p:blipFill>
         <p:spPr bwMode="auto">
           <a:xfrm>
-            <a:off x="862402" y="189374"/>
-            <a:ext cx="779967" cy="451122"/>
-          </a:xfrm>
-          <a:prstGeom prst="rect">
-            <a:avLst/>
-          </a:prstGeom>
-          <a:noFill/>
-          <a:extLst>
-            <a:ext uri="{909E8E84-426E-40DD-AFC4-6F175D3DCCD1}">
-              <a14:hiddenFill xmlns:a14="http://schemas.microsoft.com/office/drawing/2010/main">
-                <a:solidFill>
-                  <a:srgbClr val="FFFFFF"/>
-                </a:solidFill>
-              </a14:hiddenFill>
-            </a:ext>
-          </a:extLst>
-        </p:spPr>
-      </p:pic>
-      <p:sp>
-        <p:nvSpPr>
-          <p:cNvPr id="5" name="Seta: para a Direita 4">
-            <a:extLst>
-              <a:ext uri="{FF2B5EF4-FFF2-40B4-BE49-F238E27FC236}">
-                <a16:creationId xmlns:a16="http://schemas.microsoft.com/office/drawing/2014/main" id="{818B33C0-19BB-4E52-8151-F2487C1521D5}"/>
-              </a:ext>
-            </a:extLst>
-          </p:cNvPr>
-          <p:cNvSpPr/>
-          <p:nvPr/>
-        </p:nvSpPr>
-        <p:spPr>
-          <a:xfrm>
-            <a:off x="79899" y="2281695"/>
-            <a:ext cx="10315852" cy="266093"/>
-          </a:xfrm>
-          <a:prstGeom prst="rightArrow">
-            <a:avLst/>
-          </a:prstGeom>
-        </p:spPr>
-        <p:style>
-          <a:lnRef idx="2">
-            <a:schemeClr val="accent1">
-              <a:shade val="50000"/>
-            </a:schemeClr>
-          </a:lnRef>
-          <a:fillRef idx="1">
-            <a:schemeClr val="accent1"/>
-          </a:fillRef>
-          <a:effectRef idx="0">
-            <a:schemeClr val="accent1"/>
-          </a:effectRef>
-          <a:fontRef idx="minor">
-            <a:schemeClr val="lt1"/>
-          </a:fontRef>
-        </p:style>
-        <p:txBody>
-          <a:bodyPr rtlCol="0" anchor="ctr"/>
-          <a:lstStyle/>
-          <a:p>
-            <a:pPr algn="ctr"/>
-            <a:endParaRPr lang="pt-BR" dirty="0"/>
-          </a:p>
-        </p:txBody>
-      </p:sp>
-      <p:pic>
-        <p:nvPicPr>
-          <p:cNvPr id="4098" name="Picture 2">
-            <a:extLst>
-              <a:ext uri="{FF2B5EF4-FFF2-40B4-BE49-F238E27FC236}">
-                <a16:creationId xmlns:a16="http://schemas.microsoft.com/office/drawing/2014/main" id="{932083A5-2B79-48EE-B6F6-416764E72D98}"/>
-              </a:ext>
-            </a:extLst>
-          </p:cNvPr>
-          <p:cNvPicPr>
-            <a:picLocks noChangeAspect="1" noChangeArrowheads="1"/>
-          </p:cNvPicPr>
-          <p:nvPr/>
-        </p:nvPicPr>
-        <p:blipFill>
-          <a:blip r:embed="rId4">
-            <a:extLst>
-              <a:ext uri="{28A0092B-C50C-407E-A947-70E740481C1C}">
-                <a14:useLocalDpi xmlns:a14="http://schemas.microsoft.com/office/drawing/2010/main" val="0"/>
-              </a:ext>
-            </a:extLst>
-          </a:blip>
-          <a:srcRect/>
-          <a:stretch>
-            <a:fillRect/>
-          </a:stretch>
-        </p:blipFill>
-        <p:spPr bwMode="auto">
-          <a:xfrm>
-            <a:off x="4083903" y="506550"/>
+            <a:off x="4520313" y="423266"/>
             <a:ext cx="2112536" cy="1314912"/>
           </a:xfrm>
           <a:prstGeom prst="rect">
@@ -3722,10 +3696,10 @@
       </p:pic>
       <p:pic>
         <p:nvPicPr>
-          <p:cNvPr id="5122" name="Picture 2">
-            <a:extLst>
-              <a:ext uri="{FF2B5EF4-FFF2-40B4-BE49-F238E27FC236}">
-                <a16:creationId xmlns:a16="http://schemas.microsoft.com/office/drawing/2014/main" id="{3E27F745-E896-4FF4-B7C4-AC78D1F3482D}"/>
+          <p:cNvPr id="11" name="Picture 2">
+            <a:extLst>
+              <a:ext uri="{FF2B5EF4-FFF2-40B4-BE49-F238E27FC236}">
+                <a16:creationId xmlns:a16="http://schemas.microsoft.com/office/drawing/2014/main" id="{00E6A089-72EA-451F-83EC-EF4C913AAB4B}"/>
               </a:ext>
             </a:extLst>
           </p:cNvPr>
@@ -3735,7 +3709,7 @@
           <p:nvPr/>
         </p:nvPicPr>
         <p:blipFill>
-          <a:blip r:embed="rId5">
+          <a:blip r:embed="rId4">
             <a:extLst>
               <a:ext uri="{28A0092B-C50C-407E-A947-70E740481C1C}">
                 <a14:useLocalDpi xmlns:a14="http://schemas.microsoft.com/office/drawing/2010/main" val="0"/>
@@ -3749,7 +3723,7 @@
         </p:blipFill>
         <p:spPr bwMode="auto">
           <a:xfrm>
-            <a:off x="8627587" y="591276"/>
+            <a:off x="8559173" y="609601"/>
             <a:ext cx="2096639" cy="1212668"/>
           </a:xfrm>
           <a:prstGeom prst="rect">
@@ -3767,140 +3741,128 @@
           </a:extLst>
         </p:spPr>
       </p:pic>
-      <p:sp>
-        <p:nvSpPr>
-          <p:cNvPr id="2" name="CaixaDeTexto 1">
-            <a:extLst>
-              <a:ext uri="{FF2B5EF4-FFF2-40B4-BE49-F238E27FC236}">
-                <a16:creationId xmlns:a16="http://schemas.microsoft.com/office/drawing/2014/main" id="{1236B81E-494C-43F8-8D7B-A788988A241B}"/>
-              </a:ext>
-            </a:extLst>
-          </p:cNvPr>
-          <p:cNvSpPr txBox="1"/>
+      <p:pic>
+        <p:nvPicPr>
+          <p:cNvPr id="13" name="Picture 2">
+            <a:extLst>
+              <a:ext uri="{FF2B5EF4-FFF2-40B4-BE49-F238E27FC236}">
+                <a16:creationId xmlns:a16="http://schemas.microsoft.com/office/drawing/2014/main" id="{A3FB3D79-6C7E-43EF-82B9-65B279A8FC4E}"/>
+              </a:ext>
+            </a:extLst>
+          </p:cNvPr>
+          <p:cNvPicPr>
+            <a:picLocks noChangeAspect="1" noChangeArrowheads="1"/>
+          </p:cNvPicPr>
           <p:nvPr/>
-        </p:nvSpPr>
-        <p:spPr>
+        </p:nvPicPr>
+        <p:blipFill>
+          <a:blip r:embed="rId5">
+            <a:extLst>
+              <a:ext uri="{28A0092B-C50C-407E-A947-70E740481C1C}">
+                <a14:useLocalDpi xmlns:a14="http://schemas.microsoft.com/office/drawing/2010/main" val="0"/>
+              </a:ext>
+            </a:extLst>
+          </a:blip>
+          <a:srcRect/>
+          <a:stretch>
+            <a:fillRect/>
+          </a:stretch>
+        </p:blipFill>
+        <p:spPr bwMode="auto">
           <a:xfrm>
-            <a:off x="26922" y="1765199"/>
-            <a:ext cx="2529497" cy="461665"/>
+            <a:off x="6824255" y="3910608"/>
+            <a:ext cx="3831557" cy="2148429"/>
           </a:xfrm>
           <a:prstGeom prst="rect">
             <a:avLst/>
           </a:prstGeom>
           <a:noFill/>
+          <a:extLst>
+            <a:ext uri="{909E8E84-426E-40DD-AFC4-6F175D3DCCD1}">
+              <a14:hiddenFill xmlns:a14="http://schemas.microsoft.com/office/drawing/2010/main">
+                <a:solidFill>
+                  <a:srgbClr val="FFFFFF"/>
+                </a:solidFill>
+              </a14:hiddenFill>
+            </a:ext>
+          </a:extLst>
         </p:spPr>
-        <p:txBody>
-          <a:bodyPr wrap="square" rtlCol="0">
-            <a:spAutoFit/>
-          </a:bodyPr>
-          <a:lstStyle/>
-          <a:p>
-            <a:pPr algn="ctr"/>
-            <a:r>
-              <a:rPr lang="pt-BR" sz="1200" b="1" dirty="0">
-                <a:latin typeface="Avenir Next LT Pro" panose="020B0504020202020204" pitchFamily="34" charset="0"/>
-              </a:rPr>
-              <a:t>Sensores monitoram a temperatura nos containers </a:t>
-            </a:r>
-          </a:p>
-        </p:txBody>
-      </p:sp>
-      <p:sp>
-        <p:nvSpPr>
-          <p:cNvPr id="6" name="CaixaDeTexto 5">
-            <a:extLst>
-              <a:ext uri="{FF2B5EF4-FFF2-40B4-BE49-F238E27FC236}">
-                <a16:creationId xmlns:a16="http://schemas.microsoft.com/office/drawing/2014/main" id="{08926FDA-D910-4C02-A949-D68ACF77FC5F}"/>
-              </a:ext>
-            </a:extLst>
-          </p:cNvPr>
-          <p:cNvSpPr txBox="1"/>
+      </p:pic>
+      <p:pic>
+        <p:nvPicPr>
+          <p:cNvPr id="15" name="Picture 2">
+            <a:extLst>
+              <a:ext uri="{FF2B5EF4-FFF2-40B4-BE49-F238E27FC236}">
+                <a16:creationId xmlns:a16="http://schemas.microsoft.com/office/drawing/2014/main" id="{E7296E33-04A3-460E-843F-9DA4DA464401}"/>
+              </a:ext>
+            </a:extLst>
+          </p:cNvPr>
+          <p:cNvPicPr>
+            <a:picLocks noChangeAspect="1" noChangeArrowheads="1"/>
+          </p:cNvPicPr>
           <p:nvPr/>
-        </p:nvSpPr>
-        <p:spPr>
+        </p:nvPicPr>
+        <p:blipFill>
+          <a:blip r:embed="rId6">
+            <a:extLst>
+              <a:ext uri="{28A0092B-C50C-407E-A947-70E740481C1C}">
+                <a14:useLocalDpi xmlns:a14="http://schemas.microsoft.com/office/drawing/2010/main" val="0"/>
+              </a:ext>
+            </a:extLst>
+          </a:blip>
+          <a:srcRect/>
+          <a:stretch>
+            <a:fillRect/>
+          </a:stretch>
+        </p:blipFill>
+        <p:spPr bwMode="auto">
           <a:xfrm>
-            <a:off x="3474574" y="1877833"/>
-            <a:ext cx="3438618" cy="461665"/>
+            <a:off x="1356423" y="4159005"/>
+            <a:ext cx="1900032" cy="1900032"/>
           </a:xfrm>
           <a:prstGeom prst="rect">
             <a:avLst/>
           </a:prstGeom>
           <a:noFill/>
+          <a:extLst>
+            <a:ext uri="{909E8E84-426E-40DD-AFC4-6F175D3DCCD1}">
+              <a14:hiddenFill xmlns:a14="http://schemas.microsoft.com/office/drawing/2010/main">
+                <a:solidFill>
+                  <a:srgbClr val="FFFFFF"/>
+                </a:solidFill>
+              </a14:hiddenFill>
+            </a:ext>
+          </a:extLst>
         </p:spPr>
-        <p:txBody>
-          <a:bodyPr wrap="square" rtlCol="0">
-            <a:spAutoFit/>
-          </a:bodyPr>
-          <a:lstStyle/>
-          <a:p>
-            <a:pPr algn="ctr"/>
-            <a:r>
-              <a:rPr lang="pt-BR" sz="1200" b="1" dirty="0">
-                <a:latin typeface="Avenir Next LT Pro" panose="020B0504020202020204" pitchFamily="34" charset="0"/>
-              </a:rPr>
-              <a:t>O software irá disponibilizar essas informações para o cliente</a:t>
-            </a:r>
-          </a:p>
-        </p:txBody>
-      </p:sp>
-      <p:sp>
-        <p:nvSpPr>
-          <p:cNvPr id="7" name="CaixaDeTexto 6">
-            <a:extLst>
-              <a:ext uri="{FF2B5EF4-FFF2-40B4-BE49-F238E27FC236}">
-                <a16:creationId xmlns:a16="http://schemas.microsoft.com/office/drawing/2014/main" id="{5576550A-1D25-4C2A-85DB-88468A83B6EB}"/>
-              </a:ext>
-            </a:extLst>
-          </p:cNvPr>
-          <p:cNvSpPr txBox="1"/>
+      </p:pic>
+      <p:sp>
+        <p:nvSpPr>
+          <p:cNvPr id="17" name="Seta: para a Direita 16">
+            <a:extLst>
+              <a:ext uri="{FF2B5EF4-FFF2-40B4-BE49-F238E27FC236}">
+                <a16:creationId xmlns:a16="http://schemas.microsoft.com/office/drawing/2014/main" id="{E69013A5-C262-43E3-A9AA-018FE5AC302E}"/>
+              </a:ext>
+            </a:extLst>
+          </p:cNvPr>
+          <p:cNvSpPr/>
           <p:nvPr/>
         </p:nvSpPr>
         <p:spPr>
           <a:xfrm>
-            <a:off x="8103804" y="1763659"/>
-            <a:ext cx="3438618" cy="461665"/>
+            <a:off x="0" y="2259707"/>
+            <a:ext cx="10315852" cy="266093"/>
           </a:xfrm>
-          <a:prstGeom prst="rect">
+          <a:prstGeom prst="rightArrow">
             <a:avLst/>
           </a:prstGeom>
-          <a:noFill/>
-        </p:spPr>
-        <p:txBody>
-          <a:bodyPr wrap="square" rtlCol="0">
-            <a:spAutoFit/>
-          </a:bodyPr>
-          <a:lstStyle/>
-          <a:p>
-            <a:pPr algn="ctr"/>
-            <a:r>
-              <a:rPr lang="pt-BR" sz="1200" b="1" dirty="0">
-                <a:latin typeface="Avenir Next LT Pro" panose="020B0504020202020204" pitchFamily="34" charset="0"/>
-              </a:rPr>
-              <a:t>O cliente poderá tomar uma decisão sobre o conteúdo dos containers</a:t>
-            </a:r>
-          </a:p>
-        </p:txBody>
-      </p:sp>
-      <p:sp>
-        <p:nvSpPr>
-          <p:cNvPr id="10" name="Seta: em Forma de U 9">
-            <a:extLst>
-              <a:ext uri="{FF2B5EF4-FFF2-40B4-BE49-F238E27FC236}">
-                <a16:creationId xmlns:a16="http://schemas.microsoft.com/office/drawing/2014/main" id="{1733F92B-A258-42DF-BF29-695FF30F3271}"/>
-              </a:ext>
-            </a:extLst>
-          </p:cNvPr>
-          <p:cNvSpPr/>
-          <p:nvPr/>
-        </p:nvSpPr>
-        <p:spPr>
-          <a:xfrm rot="5400000">
-            <a:off x="8804855" y="3983909"/>
-            <a:ext cx="3838736" cy="549913"/>
-          </a:xfrm>
-          <a:prstGeom prst="uturnArrow">
-            <a:avLst/>
-          </a:prstGeom>
+          <a:solidFill>
+            <a:schemeClr val="tx1"/>
+          </a:solidFill>
+          <a:ln>
+            <a:solidFill>
+              <a:schemeClr val="tx1"/>
+            </a:solidFill>
+          </a:ln>
         </p:spPr>
         <p:style>
           <a:lnRef idx="2">
@@ -3923,119 +3885,38 @@
           <a:lstStyle/>
           <a:p>
             <a:pPr algn="ctr"/>
-            <a:endParaRPr lang="pt-BR">
-              <a:solidFill>
-                <a:schemeClr val="tx1"/>
-              </a:solidFill>
-            </a:endParaRPr>
-          </a:p>
-        </p:txBody>
-      </p:sp>
-      <p:pic>
-        <p:nvPicPr>
-          <p:cNvPr id="1026" name="Picture 2">
-            <a:extLst>
-              <a:ext uri="{FF2B5EF4-FFF2-40B4-BE49-F238E27FC236}">
-                <a16:creationId xmlns:a16="http://schemas.microsoft.com/office/drawing/2014/main" id="{C5C84547-2411-4A02-94F1-4BD3E694CFCF}"/>
-              </a:ext>
-            </a:extLst>
-          </p:cNvPr>
-          <p:cNvPicPr>
-            <a:picLocks noChangeAspect="1" noChangeArrowheads="1"/>
-          </p:cNvPicPr>
+            <a:endParaRPr lang="pt-BR" dirty="0"/>
+          </a:p>
+        </p:txBody>
+      </p:sp>
+      <p:sp>
+        <p:nvSpPr>
+          <p:cNvPr id="19" name="Seta: em Forma de U 18">
+            <a:extLst>
+              <a:ext uri="{FF2B5EF4-FFF2-40B4-BE49-F238E27FC236}">
+                <a16:creationId xmlns:a16="http://schemas.microsoft.com/office/drawing/2014/main" id="{2F215AE8-937E-4611-AC8D-B3DDC6EC959F}"/>
+              </a:ext>
+            </a:extLst>
+          </p:cNvPr>
+          <p:cNvSpPr/>
           <p:nvPr/>
-        </p:nvPicPr>
-        <p:blipFill>
-          <a:blip r:embed="rId6">
-            <a:extLst>
-              <a:ext uri="{28A0092B-C50C-407E-A947-70E740481C1C}">
-                <a14:useLocalDpi xmlns:a14="http://schemas.microsoft.com/office/drawing/2010/main" val="0"/>
-              </a:ext>
-            </a:extLst>
-          </a:blip>
-          <a:srcRect/>
-          <a:stretch>
-            <a:fillRect/>
-          </a:stretch>
-        </p:blipFill>
-        <p:spPr bwMode="auto">
-          <a:xfrm>
-            <a:off x="7376318" y="3936723"/>
-            <a:ext cx="3436682" cy="1927015"/>
+        </p:nvSpPr>
+        <p:spPr>
+          <a:xfrm rot="5400000">
+            <a:off x="8726496" y="4125364"/>
+            <a:ext cx="4195482" cy="549913"/>
           </a:xfrm>
-          <a:prstGeom prst="rect">
+          <a:prstGeom prst="uturnArrow">
             <a:avLst/>
           </a:prstGeom>
-          <a:noFill/>
-          <a:extLst>
-            <a:ext uri="{909E8E84-426E-40DD-AFC4-6F175D3DCCD1}">
-              <a14:hiddenFill xmlns:a14="http://schemas.microsoft.com/office/drawing/2010/main">
-                <a:solidFill>
-                  <a:srgbClr val="FFFFFF"/>
-                </a:solidFill>
-              </a14:hiddenFill>
-            </a:ext>
-          </a:extLst>
-        </p:spPr>
-      </p:pic>
-      <p:sp>
-        <p:nvSpPr>
-          <p:cNvPr id="4" name="CaixaDeTexto 3">
-            <a:extLst>
-              <a:ext uri="{FF2B5EF4-FFF2-40B4-BE49-F238E27FC236}">
-                <a16:creationId xmlns:a16="http://schemas.microsoft.com/office/drawing/2014/main" id="{3D1BD1A9-8021-4D08-A525-39365FF4E475}"/>
-              </a:ext>
-            </a:extLst>
-          </p:cNvPr>
-          <p:cNvSpPr txBox="1"/>
-          <p:nvPr/>
-        </p:nvSpPr>
-        <p:spPr>
-          <a:xfrm>
-            <a:off x="7627010" y="5679066"/>
-            <a:ext cx="2376256" cy="276999"/>
-          </a:xfrm>
-          <a:prstGeom prst="rect">
-            <a:avLst/>
-          </a:prstGeom>
-          <a:noFill/>
-        </p:spPr>
-        <p:txBody>
-          <a:bodyPr wrap="square" rtlCol="0">
-            <a:spAutoFit/>
-          </a:bodyPr>
-          <a:lstStyle/>
-          <a:p>
-            <a:pPr algn="ctr"/>
-            <a:r>
-              <a:rPr lang="pt-BR" sz="1200" b="1" dirty="0">
-                <a:latin typeface="Avenir Next LT Pro" panose="020B0504020202020204" pitchFamily="34" charset="0"/>
-              </a:rPr>
-              <a:t>Diminuindo o tempo gasto</a:t>
-            </a:r>
-          </a:p>
-        </p:txBody>
-      </p:sp>
-      <p:sp>
-        <p:nvSpPr>
-          <p:cNvPr id="8" name="Seta: para a Direita 7">
-            <a:extLst>
-              <a:ext uri="{FF2B5EF4-FFF2-40B4-BE49-F238E27FC236}">
-                <a16:creationId xmlns:a16="http://schemas.microsoft.com/office/drawing/2014/main" id="{2D1A6B2A-1E4A-4E3F-8BD4-714B66021398}"/>
-              </a:ext>
-            </a:extLst>
-          </p:cNvPr>
-          <p:cNvSpPr/>
-          <p:nvPr/>
-        </p:nvSpPr>
-        <p:spPr>
-          <a:xfrm rot="10800000">
-            <a:off x="4421079" y="5931703"/>
-            <a:ext cx="6116936" cy="266093"/>
-          </a:xfrm>
-          <a:prstGeom prst="rightArrow">
-            <a:avLst/>
-          </a:prstGeom>
+          <a:solidFill>
+            <a:schemeClr val="tx1"/>
+          </a:solidFill>
+          <a:ln>
+            <a:solidFill>
+              <a:schemeClr val="tx1"/>
+            </a:solidFill>
+          </a:ln>
         </p:spPr>
         <p:style>
           <a:lnRef idx="2">
@@ -4058,16 +3939,264 @@
           <a:lstStyle/>
           <a:p>
             <a:pPr algn="ctr"/>
+            <a:endParaRPr lang="pt-BR">
+              <a:solidFill>
+                <a:schemeClr val="tx1"/>
+              </a:solidFill>
+            </a:endParaRPr>
+          </a:p>
+        </p:txBody>
+      </p:sp>
+      <p:sp>
+        <p:nvSpPr>
+          <p:cNvPr id="21" name="Seta: para a Direita 20">
+            <a:extLst>
+              <a:ext uri="{FF2B5EF4-FFF2-40B4-BE49-F238E27FC236}">
+                <a16:creationId xmlns:a16="http://schemas.microsoft.com/office/drawing/2014/main" id="{39F91797-29D0-4E62-BCAD-3F6A29401C7B}"/>
+              </a:ext>
+            </a:extLst>
+          </p:cNvPr>
+          <p:cNvSpPr/>
+          <p:nvPr/>
+        </p:nvSpPr>
+        <p:spPr>
+          <a:xfrm rot="10800000">
+            <a:off x="4373987" y="6269879"/>
+            <a:ext cx="6116936" cy="266093"/>
+          </a:xfrm>
+          <a:prstGeom prst="rightArrow">
+            <a:avLst/>
+          </a:prstGeom>
+          <a:solidFill>
+            <a:schemeClr val="tx1"/>
+          </a:solidFill>
+          <a:ln>
+            <a:solidFill>
+              <a:schemeClr val="tx1"/>
+            </a:solidFill>
+          </a:ln>
+        </p:spPr>
+        <p:style>
+          <a:lnRef idx="2">
+            <a:schemeClr val="accent1">
+              <a:shade val="50000"/>
+            </a:schemeClr>
+          </a:lnRef>
+          <a:fillRef idx="1">
+            <a:schemeClr val="accent1"/>
+          </a:fillRef>
+          <a:effectRef idx="0">
+            <a:schemeClr val="accent1"/>
+          </a:effectRef>
+          <a:fontRef idx="minor">
+            <a:schemeClr val="lt1"/>
+          </a:fontRef>
+        </p:style>
+        <p:txBody>
+          <a:bodyPr rtlCol="0" anchor="ctr"/>
+          <a:lstStyle/>
+          <a:p>
+            <a:pPr algn="ctr"/>
             <a:endParaRPr lang="pt-BR" dirty="0"/>
+          </a:p>
+        </p:txBody>
+      </p:sp>
+      <p:sp>
+        <p:nvSpPr>
+          <p:cNvPr id="23" name="CaixaDeTexto 22">
+            <a:extLst>
+              <a:ext uri="{FF2B5EF4-FFF2-40B4-BE49-F238E27FC236}">
+                <a16:creationId xmlns:a16="http://schemas.microsoft.com/office/drawing/2014/main" id="{9504C8C7-BF4A-4235-81B8-0DC62DBD9368}"/>
+              </a:ext>
+            </a:extLst>
+          </p:cNvPr>
+          <p:cNvSpPr txBox="1"/>
+          <p:nvPr/>
+        </p:nvSpPr>
+        <p:spPr>
+          <a:xfrm>
+            <a:off x="-257055" y="1681011"/>
+            <a:ext cx="3813753" cy="461665"/>
+          </a:xfrm>
+          <a:prstGeom prst="rect">
+            <a:avLst/>
+          </a:prstGeom>
+          <a:noFill/>
+        </p:spPr>
+        <p:txBody>
+          <a:bodyPr wrap="square">
+            <a:spAutoFit/>
+          </a:bodyPr>
+          <a:lstStyle/>
+          <a:p>
+            <a:pPr algn="ctr"/>
+            <a:r>
+              <a:rPr lang="pt-BR" sz="1200" b="1" dirty="0">
+                <a:latin typeface="Avenir Next LT Pro" panose="020B0504020202020204" pitchFamily="34" charset="0"/>
+              </a:rPr>
+              <a:t>Sensores monitoram a temperatura nos containers </a:t>
+            </a:r>
+          </a:p>
+        </p:txBody>
+      </p:sp>
+      <p:sp>
+        <p:nvSpPr>
+          <p:cNvPr id="25" name="CaixaDeTexto 24">
+            <a:extLst>
+              <a:ext uri="{FF2B5EF4-FFF2-40B4-BE49-F238E27FC236}">
+                <a16:creationId xmlns:a16="http://schemas.microsoft.com/office/drawing/2014/main" id="{6DEA45BD-1338-4EB0-A0B3-5D0B99D20AC8}"/>
+              </a:ext>
+            </a:extLst>
+          </p:cNvPr>
+          <p:cNvSpPr txBox="1"/>
+          <p:nvPr/>
+        </p:nvSpPr>
+        <p:spPr>
+          <a:xfrm>
+            <a:off x="3902031" y="1802840"/>
+            <a:ext cx="3349101" cy="461665"/>
+          </a:xfrm>
+          <a:prstGeom prst="rect">
+            <a:avLst/>
+          </a:prstGeom>
+          <a:noFill/>
+        </p:spPr>
+        <p:txBody>
+          <a:bodyPr wrap="square">
+            <a:spAutoFit/>
+          </a:bodyPr>
+          <a:lstStyle/>
+          <a:p>
+            <a:pPr algn="ctr"/>
+            <a:r>
+              <a:rPr lang="pt-BR" sz="1200" b="1" dirty="0">
+                <a:latin typeface="Avenir Next LT Pro" panose="020B0504020202020204" pitchFamily="34" charset="0"/>
+              </a:rPr>
+              <a:t>O software irá disponibilizar essas informações para o cliente</a:t>
+            </a:r>
+          </a:p>
+        </p:txBody>
+      </p:sp>
+      <p:sp>
+        <p:nvSpPr>
+          <p:cNvPr id="27" name="CaixaDeTexto 26">
+            <a:extLst>
+              <a:ext uri="{FF2B5EF4-FFF2-40B4-BE49-F238E27FC236}">
+                <a16:creationId xmlns:a16="http://schemas.microsoft.com/office/drawing/2014/main" id="{48E6B923-A90C-41C3-B9B3-C762B0A66C39}"/>
+              </a:ext>
+            </a:extLst>
+          </p:cNvPr>
+          <p:cNvSpPr txBox="1"/>
+          <p:nvPr/>
+        </p:nvSpPr>
+        <p:spPr>
+          <a:xfrm>
+            <a:off x="7767595" y="1773793"/>
+            <a:ext cx="3466730" cy="430887"/>
+          </a:xfrm>
+          <a:prstGeom prst="rect">
+            <a:avLst/>
+          </a:prstGeom>
+          <a:noFill/>
+        </p:spPr>
+        <p:txBody>
+          <a:bodyPr wrap="square">
+            <a:spAutoFit/>
+          </a:bodyPr>
+          <a:lstStyle/>
+          <a:p>
+            <a:pPr algn="ctr"/>
+            <a:r>
+              <a:rPr lang="pt-BR" sz="1100" b="1" dirty="0">
+                <a:latin typeface="Avenir Next LT Pro" panose="020B0504020202020204" pitchFamily="34" charset="0"/>
+              </a:rPr>
+              <a:t>O cliente poderá tomar uma decisão sobre o conteúdo dos containers</a:t>
+            </a:r>
+          </a:p>
+        </p:txBody>
+      </p:sp>
+      <p:sp>
+        <p:nvSpPr>
+          <p:cNvPr id="29" name="CaixaDeTexto 28">
+            <a:extLst>
+              <a:ext uri="{FF2B5EF4-FFF2-40B4-BE49-F238E27FC236}">
+                <a16:creationId xmlns:a16="http://schemas.microsoft.com/office/drawing/2014/main" id="{9706F460-592D-4F42-8DC8-0FA7E50BCE3C}"/>
+              </a:ext>
+            </a:extLst>
+          </p:cNvPr>
+          <p:cNvSpPr txBox="1"/>
+          <p:nvPr/>
+        </p:nvSpPr>
+        <p:spPr>
+          <a:xfrm>
+            <a:off x="7286278" y="5864317"/>
+            <a:ext cx="2241612" cy="276999"/>
+          </a:xfrm>
+          <a:prstGeom prst="rect">
+            <a:avLst/>
+          </a:prstGeom>
+          <a:noFill/>
+        </p:spPr>
+        <p:txBody>
+          <a:bodyPr wrap="square">
+            <a:spAutoFit/>
+          </a:bodyPr>
+          <a:lstStyle/>
+          <a:p>
+            <a:pPr algn="ctr"/>
+            <a:r>
+              <a:rPr lang="pt-BR" sz="1200" b="1" dirty="0">
+                <a:latin typeface="Avenir Next LT Pro" panose="020B0504020202020204" pitchFamily="34" charset="0"/>
+              </a:rPr>
+              <a:t>Diminuindo o tempo gasto</a:t>
+            </a:r>
+          </a:p>
+        </p:txBody>
+      </p:sp>
+      <p:sp>
+        <p:nvSpPr>
+          <p:cNvPr id="31" name="CaixaDeTexto 30">
+            <a:extLst>
+              <a:ext uri="{FF2B5EF4-FFF2-40B4-BE49-F238E27FC236}">
+                <a16:creationId xmlns:a16="http://schemas.microsoft.com/office/drawing/2014/main" id="{0428C96F-96A1-486E-BA29-5868B50074DB}"/>
+              </a:ext>
+            </a:extLst>
+          </p:cNvPr>
+          <p:cNvSpPr txBox="1"/>
+          <p:nvPr/>
+        </p:nvSpPr>
+        <p:spPr>
+          <a:xfrm>
+            <a:off x="203644" y="6158298"/>
+            <a:ext cx="3670916" cy="307777"/>
+          </a:xfrm>
+          <a:prstGeom prst="rect">
+            <a:avLst/>
+          </a:prstGeom>
+          <a:noFill/>
+        </p:spPr>
+        <p:txBody>
+          <a:bodyPr wrap="square">
+            <a:spAutoFit/>
+          </a:bodyPr>
+          <a:lstStyle/>
+          <a:p>
+            <a:pPr algn="ctr"/>
+            <a:r>
+              <a:rPr lang="pt-BR" sz="1400" b="1" dirty="0">
+                <a:latin typeface="Avenir Next LT Pro" panose="020B0504020202020204" pitchFamily="34" charset="0"/>
+              </a:rPr>
+              <a:t>Reduzindo custos, e aumentando lucros</a:t>
+            </a:r>
           </a:p>
         </p:txBody>
       </p:sp>
       <p:pic>
         <p:nvPicPr>
-          <p:cNvPr id="9" name="Picture 2">
-            <a:extLst>
-              <a:ext uri="{FF2B5EF4-FFF2-40B4-BE49-F238E27FC236}">
-                <a16:creationId xmlns:a16="http://schemas.microsoft.com/office/drawing/2014/main" id="{B290D164-171B-4411-BC05-A72466C4261C}"/>
+          <p:cNvPr id="2052" name="Picture 4">
+            <a:extLst>
+              <a:ext uri="{FF2B5EF4-FFF2-40B4-BE49-F238E27FC236}">
+                <a16:creationId xmlns:a16="http://schemas.microsoft.com/office/drawing/2014/main" id="{BF66DD1F-2234-4F92-91CD-71D2B6EEB069}"/>
               </a:ext>
             </a:extLst>
           </p:cNvPr>
@@ -4091,8 +4220,8 @@
         </p:blipFill>
         <p:spPr bwMode="auto">
           <a:xfrm>
-            <a:off x="775241" y="3869260"/>
-            <a:ext cx="3562355" cy="2370585"/>
+            <a:off x="1734190" y="31842"/>
+            <a:ext cx="1413751" cy="817695"/>
           </a:xfrm>
           <a:prstGeom prst="rect">
             <a:avLst/>
@@ -4109,48 +4238,10 @@
           </a:extLst>
         </p:spPr>
       </p:pic>
-      <p:sp>
-        <p:nvSpPr>
-          <p:cNvPr id="11" name="CaixaDeTexto 10">
-            <a:extLst>
-              <a:ext uri="{FF2B5EF4-FFF2-40B4-BE49-F238E27FC236}">
-                <a16:creationId xmlns:a16="http://schemas.microsoft.com/office/drawing/2014/main" id="{CD2368B8-3113-48B7-A699-0537A645E912}"/>
-              </a:ext>
-            </a:extLst>
-          </p:cNvPr>
-          <p:cNvSpPr txBox="1"/>
-          <p:nvPr/>
-        </p:nvSpPr>
-        <p:spPr>
-          <a:xfrm>
-            <a:off x="998387" y="5910825"/>
-            <a:ext cx="3116062" cy="461665"/>
-          </a:xfrm>
-          <a:prstGeom prst="rect">
-            <a:avLst/>
-          </a:prstGeom>
-          <a:noFill/>
-        </p:spPr>
-        <p:txBody>
-          <a:bodyPr wrap="square" rtlCol="0">
-            <a:spAutoFit/>
-          </a:bodyPr>
-          <a:lstStyle/>
-          <a:p>
-            <a:pPr algn="ctr"/>
-            <a:r>
-              <a:rPr lang="pt-BR" sz="1200" b="1" dirty="0">
-                <a:latin typeface="Avenir Next LT Pro" panose="020B0504020202020204" pitchFamily="34" charset="0"/>
-              </a:rPr>
-              <a:t>Diminuindo custos, e aumentando lucros</a:t>
-            </a:r>
-          </a:p>
-        </p:txBody>
-      </p:sp>
     </p:spTree>
     <p:extLst>
       <p:ext uri="{BB962C8B-B14F-4D97-AF65-F5344CB8AC3E}">
-        <p14:creationId xmlns:p14="http://schemas.microsoft.com/office/powerpoint/2010/main" val="1946374029"/>
+        <p14:creationId xmlns:p14="http://schemas.microsoft.com/office/powerpoint/2010/main" val="628861244"/>
       </p:ext>
     </p:extLst>
   </p:cSld>

</xml_diff>